<commit_message>
latest update before mid
</commit_message>
<xml_diff>
--- a/Chapter 1-intro.pptx
+++ b/Chapter 1-intro.pptx
@@ -8416,7 +8416,18 @@
                 <a:ea typeface="Inter Bold" pitchFamily="34" charset="-122"/>
                 <a:cs typeface="Inter Bold" pitchFamily="34" charset="-120"/>
               </a:rPr>
-              <a:t>according to ISO 9126.</a:t>
+              <a:t>according to ISO 9126. </a:t>
+            </a:r>
+            <a:r>
+              <a:rPr lang="en-US" sz="2350" b="1">
+                <a:solidFill>
+                  <a:srgbClr val="000000"/>
+                </a:solidFill>
+                <a:latin typeface="Inter Bold" pitchFamily="34" charset="0"/>
+                <a:ea typeface="Inter Bold" pitchFamily="34" charset="-122"/>
+                <a:cs typeface="Inter Bold" pitchFamily="34" charset="-120"/>
+              </a:rPr>
+              <a:t>(ACSTC)</a:t>
             </a:r>
             <a:endParaRPr lang="en-US" sz="2350" dirty="0"/>
           </a:p>

</xml_diff>